<commit_message>
blue fear faces deleted
</commit_message>
<xml_diff>
--- a/ACS_Boston_2018_Irikura.pptx
+++ b/ACS_Boston_2018_Irikura.pptx
@@ -6594,7 +6594,7 @@
           <a:graphicData uri="http://schemas.openxmlformats.org/presentationml/2006/ole">
             <mc:AlternateContent xmlns:mc="http://schemas.openxmlformats.org/markup-compatibility/2006">
               <mc:Choice xmlns:v="urn:schemas-microsoft-com:vml" Requires="v">
-                <p:oleObj spid="_x0000_s3078" r:id="rId5" imgW="347220" imgH="385210" progId="">
+                <p:oleObj spid="_x0000_s3079" r:id="rId5" imgW="347220" imgH="385210" progId="">
                   <p:embed/>
                 </p:oleObj>
               </mc:Choice>
@@ -6869,19 +6869,8 @@
           <a:p>
             <a:r>
               <a:rPr lang="en-US" dirty="0"/>
-              <a:t>Smaller effects that partly cancel  </a:t>
-            </a:r>
-            <a:r>
-              <a:rPr lang="en-US" sz="3200" b="1" dirty="0">
-                <a:solidFill>
-                  <a:srgbClr val="00B0F0"/>
-                </a:solidFill>
-                <a:latin typeface="Segoe UI Symbol" panose="020B0502040204020203" pitchFamily="34" charset="0"/>
-                <a:ea typeface="Segoe UI Symbol" panose="020B0502040204020203" pitchFamily="34" charset="0"/>
-              </a:rPr>
-              <a:t>😫</a:t>
-            </a:r>
-            <a:endParaRPr lang="en-US" dirty="0"/>
+              <a:t>Smaller effects that partly cancel</a:t>
+            </a:r>
           </a:p>
           <a:p>
             <a:pPr lvl="1"/>
@@ -7209,16 +7198,6 @@
             <a:r>
               <a:rPr lang="en-US" dirty="0"/>
               <a:t>Smaller effects that partly cancel  </a:t>
-            </a:r>
-            <a:r>
-              <a:rPr lang="en-US" sz="3200" b="1" dirty="0">
-                <a:solidFill>
-                  <a:srgbClr val="00B0F0"/>
-                </a:solidFill>
-                <a:latin typeface="Segoe UI Symbol" panose="020B0502040204020203" pitchFamily="34" charset="0"/>
-                <a:ea typeface="Segoe UI Symbol" panose="020B0502040204020203" pitchFamily="34" charset="0"/>
-              </a:rPr>
-              <a:t>😫</a:t>
             </a:r>
             <a:endParaRPr lang="en-US" b="1" dirty="0">
               <a:solidFill>
@@ -9013,7 +8992,7 @@
           <a:graphicData uri="http://schemas.openxmlformats.org/presentationml/2006/ole">
             <mc:AlternateContent xmlns:mc="http://schemas.openxmlformats.org/markup-compatibility/2006">
               <mc:Choice xmlns:v="urn:schemas-microsoft-com:vml" Requires="v">
-                <p:oleObj spid="_x0000_s2091" r:id="rId6" imgW="347220" imgH="385210" progId="">
+                <p:oleObj spid="_x0000_s2092" r:id="rId6" imgW="347220" imgH="385210" progId="">
                   <p:embed/>
                 </p:oleObj>
               </mc:Choice>
@@ -9473,16 +9452,6 @@
             <a:r>
               <a:rPr lang="en-US" dirty="0"/>
               <a:t>Smaller effects that partly cancel </a:t>
-            </a:r>
-            <a:r>
-              <a:rPr lang="en-US" sz="3200" b="1" dirty="0">
-                <a:solidFill>
-                  <a:srgbClr val="00B0F0"/>
-                </a:solidFill>
-                <a:latin typeface="Segoe UI Symbol" panose="020B0502040204020203" pitchFamily="34" charset="0"/>
-                <a:ea typeface="Segoe UI Symbol" panose="020B0502040204020203" pitchFamily="34" charset="0"/>
-              </a:rPr>
-              <a:t>😫</a:t>
             </a:r>
             <a:endParaRPr lang="en-US" b="1" dirty="0"/>
           </a:p>
@@ -11439,17 +11408,6 @@
               <a:rPr lang="en-US" dirty="0"/>
               <a:t>Smaller effects that partly cancel </a:t>
             </a:r>
-            <a:r>
-              <a:rPr lang="en-US" sz="3200" b="1" dirty="0">
-                <a:solidFill>
-                  <a:srgbClr val="00B0F0"/>
-                </a:solidFill>
-                <a:latin typeface="Segoe UI Symbol" panose="020B0502040204020203" pitchFamily="34" charset="0"/>
-                <a:ea typeface="Segoe UI Symbol" panose="020B0502040204020203" pitchFamily="34" charset="0"/>
-              </a:rPr>
-              <a:t>😫</a:t>
-            </a:r>
-            <a:endParaRPr lang="en-US" dirty="0"/>
           </a:p>
           <a:p>
             <a:pPr lvl="1"/>
@@ -12701,17 +12659,6 @@
               <a:rPr lang="en-US" dirty="0"/>
               <a:t>Smaller effects that partly cancel </a:t>
             </a:r>
-            <a:r>
-              <a:rPr lang="en-US" sz="3200" b="1" dirty="0">
-                <a:solidFill>
-                  <a:srgbClr val="00B0F0"/>
-                </a:solidFill>
-                <a:latin typeface="Segoe UI Symbol" panose="020B0502040204020203" pitchFamily="34" charset="0"/>
-                <a:ea typeface="Segoe UI Symbol" panose="020B0502040204020203" pitchFamily="34" charset="0"/>
-              </a:rPr>
-              <a:t>😫</a:t>
-            </a:r>
-            <a:endParaRPr lang="en-US" dirty="0"/>
           </a:p>
           <a:p>
             <a:pPr lvl="1"/>
@@ -16788,7 +16735,7 @@
           <a:graphicData uri="http://schemas.openxmlformats.org/presentationml/2006/ole">
             <mc:AlternateContent xmlns:mc="http://schemas.openxmlformats.org/markup-compatibility/2006">
               <mc:Choice xmlns:v="urn:schemas-microsoft-com:vml" Requires="v">
-                <p:oleObj spid="_x0000_s1073" name="Equation" r:id="rId4" imgW="3162240" imgH="469800" progId="Equation.DSMT4">
+                <p:oleObj spid="_x0000_s1074" name="Equation" r:id="rId4" imgW="3162240" imgH="469800" progId="Equation.DSMT4">
                   <p:embed/>
                 </p:oleObj>
               </mc:Choice>

</xml_diff>